<commit_message>
1. fixed a typo
</commit_message>
<xml_diff>
--- a/doc/seminar/C++로 만들어보는 Web API #7.pptx
+++ b/doc/seminar/C++로 만들어보는 Web API #7.pptx
@@ -203,7 +203,7 @@
           <a:p>
             <a:fld id="{952A97FD-4B57-764D-93A0-D680EC949FEA}" type="datetimeFigureOut">
               <a:rPr kumimoji="1" lang="ko-KR" altLang="en-US" smtClean="0"/>
-              <a:t>2016. 1. 9.</a:t>
+              <a:t>2016. 1. 10.</a:t>
             </a:fld>
             <a:endParaRPr kumimoji="1" lang="ko-KR" altLang="en-US"/>
           </a:p>
@@ -659,7 +659,7 @@
           <a:p>
             <a:fld id="{BB02557A-7053-4340-A874-8AB926A8EDA1}" type="datetimeFigureOut">
               <a:rPr lang="en-US" smtClean="0"/>
-              <a:t>1/9/16</a:t>
+              <a:t>1/10/16</a:t>
             </a:fld>
             <a:endParaRPr lang="en-US" dirty="0"/>
           </a:p>
@@ -1004,7 +1004,7 @@
             <a:fld id="{BB02557A-7053-4340-A874-8AB926A8EDA1}" type="datetimeFigureOut">
               <a:rPr lang="en-US" smtClean="0"/>
               <a:pPr/>
-              <a:t>1/9/16</a:t>
+              <a:t>1/10/16</a:t>
             </a:fld>
             <a:endParaRPr lang="en-US" dirty="0"/>
           </a:p>
@@ -1407,7 +1407,7 @@
             <a:fld id="{BB02557A-7053-4340-A874-8AB926A8EDA1}" type="datetimeFigureOut">
               <a:rPr lang="en-US" smtClean="0"/>
               <a:pPr/>
-              <a:t>1/9/16</a:t>
+              <a:t>1/10/16</a:t>
             </a:fld>
             <a:endParaRPr lang="en-US" dirty="0"/>
           </a:p>
@@ -1745,7 +1745,7 @@
             <a:fld id="{BB02557A-7053-4340-A874-8AB926A8EDA1}" type="datetimeFigureOut">
               <a:rPr lang="en-US" smtClean="0"/>
               <a:pPr/>
-              <a:t>1/9/16</a:t>
+              <a:t>1/10/16</a:t>
             </a:fld>
             <a:endParaRPr lang="en-US" dirty="0"/>
           </a:p>
@@ -2067,7 +2067,7 @@
             <a:fld id="{BB02557A-7053-4340-A874-8AB926A8EDA1}" type="datetimeFigureOut">
               <a:rPr lang="en-US" smtClean="0"/>
               <a:pPr/>
-              <a:t>1/9/16</a:t>
+              <a:t>1/10/16</a:t>
             </a:fld>
             <a:endParaRPr lang="en-US" dirty="0"/>
           </a:p>
@@ -2465,7 +2465,7 @@
             <a:fld id="{BB02557A-7053-4340-A874-8AB926A8EDA1}" type="datetimeFigureOut">
               <a:rPr lang="en-US" smtClean="0"/>
               <a:pPr/>
-              <a:t>1/9/16</a:t>
+              <a:t>1/10/16</a:t>
             </a:fld>
             <a:endParaRPr lang="en-US" dirty="0"/>
           </a:p>
@@ -2723,7 +2723,7 @@
           <a:p>
             <a:fld id="{BB02557A-7053-4340-A874-8AB926A8EDA1}" type="datetimeFigureOut">
               <a:rPr lang="en-US" smtClean="0"/>
-              <a:t>1/9/16</a:t>
+              <a:t>1/10/16</a:t>
             </a:fld>
             <a:endParaRPr lang="en-US" dirty="0"/>
           </a:p>
@@ -2985,7 +2985,7 @@
           <a:p>
             <a:fld id="{BB02557A-7053-4340-A874-8AB926A8EDA1}" type="datetimeFigureOut">
               <a:rPr lang="en-US" smtClean="0"/>
-              <a:t>1/9/16</a:t>
+              <a:t>1/10/16</a:t>
             </a:fld>
             <a:endParaRPr lang="en-US" dirty="0"/>
           </a:p>
@@ -3253,7 +3253,7 @@
           <a:p>
             <a:fld id="{BB02557A-7053-4340-A874-8AB926A8EDA1}" type="datetimeFigureOut">
               <a:rPr lang="en-US" smtClean="0"/>
-              <a:t>1/9/16</a:t>
+              <a:t>1/10/16</a:t>
             </a:fld>
             <a:endParaRPr lang="en-US" dirty="0"/>
           </a:p>
@@ -3583,7 +3583,7 @@
             <a:fld id="{BB02557A-7053-4340-A874-8AB926A8EDA1}" type="datetimeFigureOut">
               <a:rPr lang="en-US" smtClean="0"/>
               <a:pPr/>
-              <a:t>1/9/16</a:t>
+              <a:t>1/10/16</a:t>
             </a:fld>
             <a:endParaRPr lang="en-US" dirty="0"/>
           </a:p>
@@ -3912,7 +3912,7 @@
           <a:p>
             <a:fld id="{BB02557A-7053-4340-A874-8AB926A8EDA1}" type="datetimeFigureOut">
               <a:rPr lang="en-US" smtClean="0"/>
-              <a:t>1/9/16</a:t>
+              <a:t>1/10/16</a:t>
             </a:fld>
             <a:endParaRPr lang="en-US" dirty="0"/>
           </a:p>
@@ -4374,7 +4374,7 @@
           <a:p>
             <a:fld id="{BB02557A-7053-4340-A874-8AB926A8EDA1}" type="datetimeFigureOut">
               <a:rPr lang="en-US" smtClean="0"/>
-              <a:t>1/9/16</a:t>
+              <a:t>1/10/16</a:t>
             </a:fld>
             <a:endParaRPr lang="en-US" dirty="0"/>
           </a:p>
@@ -4584,7 +4584,7 @@
           <a:p>
             <a:fld id="{BB02557A-7053-4340-A874-8AB926A8EDA1}" type="datetimeFigureOut">
               <a:rPr lang="en-US" smtClean="0"/>
-              <a:t>1/9/16</a:t>
+              <a:t>1/10/16</a:t>
             </a:fld>
             <a:endParaRPr lang="en-US" dirty="0"/>
           </a:p>
@@ -4761,7 +4761,7 @@
           <a:p>
             <a:fld id="{BB02557A-7053-4340-A874-8AB926A8EDA1}" type="datetimeFigureOut">
               <a:rPr lang="en-US" smtClean="0"/>
-              <a:t>1/9/16</a:t>
+              <a:t>1/10/16</a:t>
             </a:fld>
             <a:endParaRPr lang="en-US" dirty="0"/>
           </a:p>
@@ -5100,7 +5100,7 @@
             <a:fld id="{BB02557A-7053-4340-A874-8AB926A8EDA1}" type="datetimeFigureOut">
               <a:rPr lang="en-US" smtClean="0"/>
               <a:pPr/>
-              <a:t>1/9/16</a:t>
+              <a:t>1/10/16</a:t>
             </a:fld>
             <a:endParaRPr lang="en-US" dirty="0"/>
           </a:p>
@@ -5452,7 +5452,7 @@
             <a:fld id="{BB02557A-7053-4340-A874-8AB926A8EDA1}" type="datetimeFigureOut">
               <a:rPr lang="en-US" smtClean="0"/>
               <a:pPr/>
-              <a:t>1/9/16</a:t>
+              <a:t>1/10/16</a:t>
             </a:fld>
             <a:endParaRPr lang="en-US" dirty="0"/>
           </a:p>
@@ -7571,7 +7571,7 @@
             <a:fld id="{BB02557A-7053-4340-A874-8AB926A8EDA1}" type="datetimeFigureOut">
               <a:rPr lang="en-US" smtClean="0"/>
               <a:pPr/>
-              <a:t>1/9/16</a:t>
+              <a:t>1/10/16</a:t>
             </a:fld>
             <a:endParaRPr lang="en-US" dirty="0"/>
           </a:p>
@@ -8129,11 +8129,7 @@
             </a:br>
             <a:r>
               <a:rPr lang="en-US" altLang="ko-KR" dirty="0" smtClean="0"/>
-              <a:t>Web API - </a:t>
-            </a:r>
-            <a:r>
-              <a:rPr lang="en-US" altLang="ko-KR" dirty="0" smtClean="0"/>
-              <a:t>#7</a:t>
+              <a:t>Web API - #7</a:t>
             </a:r>
             <a:endParaRPr lang="en-US" dirty="0"/>
           </a:p>
@@ -8271,7 +8267,6 @@
               <a:rPr lang="ko-KR" altLang="en-US" dirty="0" smtClean="0"/>
               <a:t>일정</a:t>
             </a:r>
-            <a:endParaRPr lang="ko-KR" altLang="en-US" dirty="0" smtClean="0"/>
           </a:p>
           <a:p>
             <a:pPr lvl="1"/>
@@ -9445,11 +9440,7 @@
             </a:r>
             <a:r>
               <a:rPr lang="ko-KR" altLang="en-US" dirty="0" smtClean="0"/>
-              <a:t> </a:t>
-            </a:r>
-            <a:r>
-              <a:rPr lang="ko-KR" altLang="en-US" dirty="0" smtClean="0"/>
-              <a:t>강</a:t>
+              <a:t> 강</a:t>
             </a:r>
             <a:r>
               <a:rPr lang="ko-KR" altLang="en-US" dirty="0"/>
@@ -9488,7 +9479,7 @@
         </p:spPr>
         <p:txBody>
           <a:bodyPr>
-            <a:normAutofit/>
+            <a:normAutofit fontScale="92500" lnSpcReduction="10000"/>
           </a:bodyPr>
           <a:lstStyle/>
           <a:p>
@@ -9635,6 +9626,57 @@
             <a:r>
               <a:rPr lang="ko-KR" altLang="en-US" sz="2000" dirty="0" smtClean="0"/>
               <a:t>구현</a:t>
+            </a:r>
+            <a:endParaRPr lang="en-US" altLang="ko-KR" sz="2000" dirty="0" smtClean="0"/>
+          </a:p>
+          <a:p>
+            <a:pPr marL="800088" lvl="1" indent="-342900">
+              <a:buFont typeface="+mj-lt"/>
+              <a:buAutoNum type="arabicPeriod"/>
+            </a:pPr>
+            <a:r>
+              <a:rPr lang="en-US" altLang="ko-KR" sz="2000" dirty="0" smtClean="0"/>
+              <a:t>One source – Multi Platform, Multi Language</a:t>
+            </a:r>
+          </a:p>
+          <a:p>
+            <a:pPr marL="1200127" lvl="2" indent="-342900">
+              <a:buFont typeface="+mj-lt"/>
+              <a:buAutoNum type="arabicPeriod"/>
+            </a:pPr>
+            <a:r>
+              <a:rPr lang="en-US" altLang="ko-KR" dirty="0" smtClean="0"/>
+              <a:t>Win32, i386 Linux </a:t>
+            </a:r>
+            <a:r>
+              <a:rPr lang="ko-KR" altLang="en-US" dirty="0" smtClean="0"/>
+              <a:t>및 </a:t>
+            </a:r>
+            <a:r>
+              <a:rPr lang="en-US" altLang="ko-KR" dirty="0" smtClean="0"/>
+              <a:t>Arm Linux</a:t>
+            </a:r>
+          </a:p>
+          <a:p>
+            <a:pPr marL="1200127" lvl="2" indent="-342900">
+              <a:buFont typeface="+mj-lt"/>
+              <a:buAutoNum type="arabicPeriod"/>
+            </a:pPr>
+            <a:r>
+              <a:rPr lang="en-US" altLang="ko-KR" dirty="0" smtClean="0"/>
+              <a:t>C++/C </a:t>
+            </a:r>
+            <a:r>
+              <a:rPr lang="ko-KR" altLang="en-US" dirty="0" smtClean="0"/>
+              <a:t>및 </a:t>
+            </a:r>
+            <a:r>
+              <a:rPr lang="en-US" altLang="ko-KR" dirty="0" smtClean="0"/>
+              <a:t>JavaScript</a:t>
+            </a:r>
+            <a:r>
+              <a:rPr lang="ko-KR" altLang="en-US" smtClean="0"/>
+              <a:t> 지원</a:t>
             </a:r>
           </a:p>
           <a:p>
@@ -9753,7 +9795,6 @@
               <a:rPr lang="en-US" altLang="ko-KR" dirty="0" smtClean="0"/>
               <a:t> Device Manager</a:t>
             </a:r>
-            <a:endParaRPr lang="en-US" altLang="ko-KR" dirty="0" smtClean="0"/>
           </a:p>
           <a:p>
             <a:pPr lvl="1"/>
@@ -9919,24 +9960,36 @@
               <a:t> </a:t>
             </a:r>
             <a:r>
-              <a:rPr lang="en-US" altLang="ko-KR" dirty="0" err="1" smtClean="0"/>
-              <a:t>Devie</a:t>
+              <a:rPr lang="en-US" altLang="ko-KR" dirty="0"/>
+              <a:t>Device</a:t>
+            </a:r>
+            <a:r>
+              <a:rPr lang="ko-KR" altLang="en-US" dirty="0"/>
+              <a:t> </a:t>
             </a:r>
             <a:r>
               <a:rPr lang="en-US" altLang="ko-KR" dirty="0" smtClean="0"/>
-              <a:t> Specification</a:t>
+              <a:t>Specification</a:t>
             </a:r>
             <a:r>
               <a:rPr lang="ko-KR" altLang="en-US" dirty="0" smtClean="0"/>
-              <a:t> 변경으로 </a:t>
-            </a:r>
-            <a:r>
-              <a:rPr lang="en-US" altLang="ko-KR" dirty="0" err="1" smtClean="0"/>
-              <a:t>Devie</a:t>
+              <a:t> </a:t>
             </a:r>
             <a:r>
               <a:rPr lang="ko-KR" altLang="en-US" dirty="0" smtClean="0"/>
-              <a:t>을 제어</a:t>
+              <a:t>변경으로 </a:t>
+            </a:r>
+            <a:r>
+              <a:rPr lang="en-US" altLang="ko-KR" dirty="0"/>
+              <a:t>Device</a:t>
+            </a:r>
+            <a:r>
+              <a:rPr lang="ko-KR" altLang="en-US" dirty="0"/>
+              <a:t> 을 </a:t>
+            </a:r>
+            <a:r>
+              <a:rPr lang="ko-KR" altLang="en-US" dirty="0" smtClean="0"/>
+              <a:t>제어</a:t>
             </a:r>
             <a:endParaRPr lang="en-US" altLang="ko-KR" dirty="0" smtClean="0"/>
           </a:p>

</xml_diff>